<commit_message>
HMI thread added, Teleop thread added, ArdOs statistics added
</commit_message>
<xml_diff>
--- a/docs/PMI2017_archiSW.pptx
+++ b/docs/PMI2017_archiSW.pptx
@@ -105,6 +105,11 @@
       </a:defRPr>
     </a:lvl9pPr>
   </p:defaultTextStyle>
+  <p:extLst>
+    <p:ext uri="{EFAFB233-063F-42B5-8137-9DF3F51BA10A}">
+      <p15:sldGuideLst xmlns:p15="http://schemas.microsoft.com/office/powerpoint/2012/main"/>
+    </p:ext>
+  </p:extLst>
 </p:presentation>
 </file>
 
@@ -153,7 +158,6 @@
               <a:rPr lang="fr-FR"/>
               <a:t>Modifiez le style du titre</a:t>
             </a:r>
-            <a:endParaRPr lang="fr-FR"/>
           </a:p>
         </p:txBody>
       </p:sp>
@@ -218,7 +222,6 @@
               <a:rPr lang="fr-FR"/>
               <a:t>Modifier le style des sous-titres du masque</a:t>
             </a:r>
-            <a:endParaRPr lang="fr-FR"/>
           </a:p>
         </p:txBody>
       </p:sp>
@@ -239,7 +242,7 @@
           <a:p>
             <a:fld id="{2782ACDD-568A-4D5B-9A72-61F2F85B1323}" type="datetimeFigureOut">
               <a:rPr lang="fr-FR" smtClean="0"/>
-              <a:t>18/10/2016</a:t>
+              <a:t>21/10/2016</a:t>
             </a:fld>
             <a:endParaRPr lang="fr-FR"/>
           </a:p>
@@ -336,7 +339,6 @@
               <a:rPr lang="fr-FR"/>
               <a:t>Modifiez le style du titre</a:t>
             </a:r>
-            <a:endParaRPr lang="fr-FR"/>
           </a:p>
         </p:txBody>
       </p:sp>
@@ -388,7 +390,6 @@
               <a:rPr lang="fr-FR"/>
               <a:t>Cinquième niveau</a:t>
             </a:r>
-            <a:endParaRPr lang="fr-FR"/>
           </a:p>
         </p:txBody>
       </p:sp>
@@ -409,7 +410,7 @@
           <a:p>
             <a:fld id="{2782ACDD-568A-4D5B-9A72-61F2F85B1323}" type="datetimeFigureOut">
               <a:rPr lang="fr-FR" smtClean="0"/>
-              <a:t>18/10/2016</a:t>
+              <a:t>21/10/2016</a:t>
             </a:fld>
             <a:endParaRPr lang="fr-FR"/>
           </a:p>
@@ -511,7 +512,6 @@
               <a:rPr lang="fr-FR"/>
               <a:t>Modifiez le style du titre</a:t>
             </a:r>
-            <a:endParaRPr lang="fr-FR"/>
           </a:p>
         </p:txBody>
       </p:sp>
@@ -568,7 +568,6 @@
               <a:rPr lang="fr-FR"/>
               <a:t>Cinquième niveau</a:t>
             </a:r>
-            <a:endParaRPr lang="fr-FR"/>
           </a:p>
         </p:txBody>
       </p:sp>
@@ -589,7 +588,7 @@
           <a:p>
             <a:fld id="{2782ACDD-568A-4D5B-9A72-61F2F85B1323}" type="datetimeFigureOut">
               <a:rPr lang="fr-FR" smtClean="0"/>
-              <a:t>18/10/2016</a:t>
+              <a:t>21/10/2016</a:t>
             </a:fld>
             <a:endParaRPr lang="fr-FR"/>
           </a:p>
@@ -686,7 +685,6 @@
               <a:rPr lang="fr-FR"/>
               <a:t>Modifiez le style du titre</a:t>
             </a:r>
-            <a:endParaRPr lang="fr-FR"/>
           </a:p>
         </p:txBody>
       </p:sp>
@@ -738,7 +736,6 @@
               <a:rPr lang="fr-FR"/>
               <a:t>Cinquième niveau</a:t>
             </a:r>
-            <a:endParaRPr lang="fr-FR"/>
           </a:p>
         </p:txBody>
       </p:sp>
@@ -759,7 +756,7 @@
           <a:p>
             <a:fld id="{2782ACDD-568A-4D5B-9A72-61F2F85B1323}" type="datetimeFigureOut">
               <a:rPr lang="fr-FR" smtClean="0"/>
-              <a:t>18/10/2016</a:t>
+              <a:t>21/10/2016</a:t>
             </a:fld>
             <a:endParaRPr lang="fr-FR"/>
           </a:p>
@@ -865,7 +862,6 @@
               <a:rPr lang="fr-FR"/>
               <a:t>Modifiez le style du titre</a:t>
             </a:r>
-            <a:endParaRPr lang="fr-FR"/>
           </a:p>
         </p:txBody>
       </p:sp>
@@ -1005,7 +1001,7 @@
           <a:p>
             <a:fld id="{2782ACDD-568A-4D5B-9A72-61F2F85B1323}" type="datetimeFigureOut">
               <a:rPr lang="fr-FR" smtClean="0"/>
-              <a:t>18/10/2016</a:t>
+              <a:t>21/10/2016</a:t>
             </a:fld>
             <a:endParaRPr lang="fr-FR"/>
           </a:p>
@@ -1102,7 +1098,6 @@
               <a:rPr lang="fr-FR"/>
               <a:t>Modifiez le style du titre</a:t>
             </a:r>
-            <a:endParaRPr lang="fr-FR"/>
           </a:p>
         </p:txBody>
       </p:sp>
@@ -1159,7 +1154,6 @@
               <a:rPr lang="fr-FR"/>
               <a:t>Cinquième niveau</a:t>
             </a:r>
-            <a:endParaRPr lang="fr-FR"/>
           </a:p>
         </p:txBody>
       </p:sp>
@@ -1216,7 +1210,6 @@
               <a:rPr lang="fr-FR"/>
               <a:t>Cinquième niveau</a:t>
             </a:r>
-            <a:endParaRPr lang="fr-FR"/>
           </a:p>
         </p:txBody>
       </p:sp>
@@ -1237,7 +1230,7 @@
           <a:p>
             <a:fld id="{2782ACDD-568A-4D5B-9A72-61F2F85B1323}" type="datetimeFigureOut">
               <a:rPr lang="fr-FR" smtClean="0"/>
-              <a:t>18/10/2016</a:t>
+              <a:t>21/10/2016</a:t>
             </a:fld>
             <a:endParaRPr lang="fr-FR"/>
           </a:p>
@@ -1339,7 +1332,6 @@
               <a:rPr lang="fr-FR"/>
               <a:t>Modifiez le style du titre</a:t>
             </a:r>
-            <a:endParaRPr lang="fr-FR"/>
           </a:p>
         </p:txBody>
       </p:sp>
@@ -1461,7 +1453,6 @@
               <a:rPr lang="fr-FR"/>
               <a:t>Cinquième niveau</a:t>
             </a:r>
-            <a:endParaRPr lang="fr-FR"/>
           </a:p>
         </p:txBody>
       </p:sp>
@@ -1583,7 +1574,6 @@
               <a:rPr lang="fr-FR"/>
               <a:t>Cinquième niveau</a:t>
             </a:r>
-            <a:endParaRPr lang="fr-FR"/>
           </a:p>
         </p:txBody>
       </p:sp>
@@ -1604,7 +1594,7 @@
           <a:p>
             <a:fld id="{2782ACDD-568A-4D5B-9A72-61F2F85B1323}" type="datetimeFigureOut">
               <a:rPr lang="fr-FR" smtClean="0"/>
-              <a:t>18/10/2016</a:t>
+              <a:t>21/10/2016</a:t>
             </a:fld>
             <a:endParaRPr lang="fr-FR"/>
           </a:p>
@@ -1701,7 +1691,6 @@
               <a:rPr lang="fr-FR"/>
               <a:t>Modifiez le style du titre</a:t>
             </a:r>
-            <a:endParaRPr lang="fr-FR"/>
           </a:p>
         </p:txBody>
       </p:sp>
@@ -1722,7 +1711,7 @@
           <a:p>
             <a:fld id="{2782ACDD-568A-4D5B-9A72-61F2F85B1323}" type="datetimeFigureOut">
               <a:rPr lang="fr-FR" smtClean="0"/>
-              <a:t>18/10/2016</a:t>
+              <a:t>21/10/2016</a:t>
             </a:fld>
             <a:endParaRPr lang="fr-FR"/>
           </a:p>
@@ -1817,7 +1806,7 @@
           <a:p>
             <a:fld id="{2782ACDD-568A-4D5B-9A72-61F2F85B1323}" type="datetimeFigureOut">
               <a:rPr lang="fr-FR" smtClean="0"/>
-              <a:t>18/10/2016</a:t>
+              <a:t>21/10/2016</a:t>
             </a:fld>
             <a:endParaRPr lang="fr-FR"/>
           </a:p>
@@ -1923,7 +1912,6 @@
               <a:rPr lang="fr-FR"/>
               <a:t>Modifiez le style du titre</a:t>
             </a:r>
-            <a:endParaRPr lang="fr-FR"/>
           </a:p>
         </p:txBody>
       </p:sp>
@@ -2008,7 +1996,6 @@
               <a:rPr lang="fr-FR"/>
               <a:t>Cinquième niveau</a:t>
             </a:r>
-            <a:endParaRPr lang="fr-FR"/>
           </a:p>
         </p:txBody>
       </p:sp>
@@ -2094,7 +2081,7 @@
           <a:p>
             <a:fld id="{2782ACDD-568A-4D5B-9A72-61F2F85B1323}" type="datetimeFigureOut">
               <a:rPr lang="fr-FR" smtClean="0"/>
-              <a:t>18/10/2016</a:t>
+              <a:t>21/10/2016</a:t>
             </a:fld>
             <a:endParaRPr lang="fr-FR"/>
           </a:p>
@@ -2200,7 +2187,6 @@
               <a:rPr lang="fr-FR"/>
               <a:t>Modifiez le style du titre</a:t>
             </a:r>
-            <a:endParaRPr lang="fr-FR"/>
           </a:p>
         </p:txBody>
       </p:sp>
@@ -2347,7 +2333,7 @@
           <a:p>
             <a:fld id="{2782ACDD-568A-4D5B-9A72-61F2F85B1323}" type="datetimeFigureOut">
               <a:rPr lang="fr-FR" smtClean="0"/>
-              <a:t>18/10/2016</a:t>
+              <a:t>21/10/2016</a:t>
             </a:fld>
             <a:endParaRPr lang="fr-FR"/>
           </a:p>
@@ -2459,7 +2445,6 @@
               <a:rPr lang="fr-FR"/>
               <a:t>Modifiez le style du titre</a:t>
             </a:r>
-            <a:endParaRPr lang="fr-FR"/>
           </a:p>
         </p:txBody>
       </p:sp>
@@ -2521,7 +2506,6 @@
               <a:rPr lang="fr-FR"/>
               <a:t>Cinquième niveau</a:t>
             </a:r>
-            <a:endParaRPr lang="fr-FR"/>
           </a:p>
         </p:txBody>
       </p:sp>
@@ -2560,7 +2544,7 @@
           <a:p>
             <a:fld id="{2782ACDD-568A-4D5B-9A72-61F2F85B1323}" type="datetimeFigureOut">
               <a:rPr lang="fr-FR" smtClean="0"/>
-              <a:t>18/10/2016</a:t>
+              <a:t>21/10/2016</a:t>
             </a:fld>
             <a:endParaRPr lang="fr-FR"/>
           </a:p>
@@ -3320,8 +3304,8 @@
           <a:p>
             <a:pPr algn="ctr"/>
             <a:r>
-              <a:rPr lang="en-US" dirty="0" err="1"/>
-              <a:t>Gpio</a:t>
+              <a:rPr lang="en-US" dirty="0" smtClean="0"/>
+              <a:t>Arduino core</a:t>
             </a:r>
             <a:endParaRPr lang="fr-FR" dirty="0"/>
           </a:p>
@@ -4060,8 +4044,8 @@
         </p:nvSpPr>
         <p:spPr>
           <a:xfrm>
-            <a:off x="2931467" y="4297670"/>
-            <a:ext cx="1231290" cy="643233"/>
+            <a:off x="2844099" y="4297670"/>
+            <a:ext cx="1318658" cy="643233"/>
           </a:xfrm>
           <a:prstGeom prst="roundRect">
             <a:avLst/>
@@ -4089,8 +4073,52 @@
           <a:p>
             <a:pPr algn="ctr"/>
             <a:r>
-              <a:rPr lang="en-US" dirty="0"/>
-              <a:t>Setup</a:t>
+              <a:rPr lang="en-US" dirty="0" smtClean="0"/>
+              <a:t>Robot2017</a:t>
+            </a:r>
+            <a:endParaRPr lang="fr-FR" dirty="0"/>
+          </a:p>
+        </p:txBody>
+      </p:sp>
+      <p:sp>
+        <p:nvSpPr>
+          <p:cNvPr id="25" name="Rectangle : coins arrondis 13"/>
+          <p:cNvSpPr/>
+          <p:nvPr/>
+        </p:nvSpPr>
+        <p:spPr>
+          <a:xfrm>
+            <a:off x="5994047" y="2638608"/>
+            <a:ext cx="1304335" cy="643233"/>
+          </a:xfrm>
+          <a:prstGeom prst="roundRect">
+            <a:avLst/>
+          </a:prstGeom>
+        </p:spPr>
+        <p:style>
+          <a:lnRef idx="2">
+            <a:schemeClr val="accent2">
+              <a:shade val="50000"/>
+            </a:schemeClr>
+          </a:lnRef>
+          <a:fillRef idx="1">
+            <a:schemeClr val="accent2"/>
+          </a:fillRef>
+          <a:effectRef idx="0">
+            <a:schemeClr val="accent2"/>
+          </a:effectRef>
+          <a:fontRef idx="minor">
+            <a:schemeClr val="lt1"/>
+          </a:fontRef>
+        </p:style>
+        <p:txBody>
+          <a:bodyPr rtlCol="0" anchor="ctr"/>
+          <a:lstStyle/>
+          <a:p>
+            <a:pPr algn="ctr"/>
+            <a:r>
+              <a:rPr lang="en-US" smtClean="0"/>
+              <a:t>HMI</a:t>
             </a:r>
             <a:endParaRPr lang="fr-FR" dirty="0"/>
           </a:p>
@@ -4136,14 +4164,14 @@
             <p:ph idx="1"/>
             <p:extLst>
               <p:ext uri="{D42A27DB-BD31-4B8C-83A1-F6EECF244321}">
-                <p14:modId xmlns:p14="http://schemas.microsoft.com/office/powerpoint/2010/main" val="1964045350"/>
+                <p14:modId xmlns:p14="http://schemas.microsoft.com/office/powerpoint/2010/main" val="3339735760"/>
               </p:ext>
             </p:extLst>
           </p:nvPr>
         </p:nvGraphicFramePr>
         <p:xfrm>
           <a:off x="990075" y="290084"/>
-          <a:ext cx="9960128" cy="6215733"/>
+          <a:ext cx="9960128" cy="6198696"/>
         </p:xfrm>
         <a:graphic>
           <a:graphicData uri="http://schemas.openxmlformats.org/drawingml/2006/table">
@@ -4155,14 +4183,14 @@
                 <a:gridCol w="2843689">
                   <a:extLst>
                     <a:ext uri="{9D8B030D-6E8A-4147-A177-3AD203B41FA5}">
-                      <a16:colId xmlns:a16="http://schemas.microsoft.com/office/drawing/2014/main" val="4249046580"/>
+                      <a16:colId xmlns:a16="http://schemas.microsoft.com/office/drawing/2014/main" xmlns="" val="4249046580"/>
                     </a:ext>
                   </a:extLst>
                 </a:gridCol>
                 <a:gridCol w="7116439">
                   <a:extLst>
                     <a:ext uri="{9D8B030D-6E8A-4147-A177-3AD203B41FA5}">
-                      <a16:colId xmlns:a16="http://schemas.microsoft.com/office/drawing/2014/main" val="2166689304"/>
+                      <a16:colId xmlns:a16="http://schemas.microsoft.com/office/drawing/2014/main" xmlns="" val="2166689304"/>
                     </a:ext>
                   </a:extLst>
                 </a:gridCol>
@@ -4198,7 +4226,7 @@
                 </a:tc>
                 <a:extLst>
                   <a:ext uri="{0D108BD9-81ED-4DB2-BD59-A6C34878D82A}">
-                    <a16:rowId xmlns:a16="http://schemas.microsoft.com/office/drawing/2014/main" val="1558262199"/>
+                    <a16:rowId xmlns:a16="http://schemas.microsoft.com/office/drawing/2014/main" xmlns="" val="1558262199"/>
                   </a:ext>
                 </a:extLst>
               </a:tr>
@@ -4241,7 +4269,7 @@
                 </a:tc>
                 <a:extLst>
                   <a:ext uri="{0D108BD9-81ED-4DB2-BD59-A6C34878D82A}">
-                    <a16:rowId xmlns:a16="http://schemas.microsoft.com/office/drawing/2014/main" val="3975330181"/>
+                    <a16:rowId xmlns:a16="http://schemas.microsoft.com/office/drawing/2014/main" xmlns="" val="3975330181"/>
                   </a:ext>
                 </a:extLst>
               </a:tr>
@@ -4276,7 +4304,7 @@
                 </a:tc>
                 <a:extLst>
                   <a:ext uri="{0D108BD9-81ED-4DB2-BD59-A6C34878D82A}">
-                    <a16:rowId xmlns:a16="http://schemas.microsoft.com/office/drawing/2014/main" val="145727790"/>
+                    <a16:rowId xmlns:a16="http://schemas.microsoft.com/office/drawing/2014/main" xmlns="" val="145727790"/>
                   </a:ext>
                 </a:extLst>
               </a:tr>
@@ -4311,7 +4339,7 @@
                 </a:tc>
                 <a:extLst>
                   <a:ext uri="{0D108BD9-81ED-4DB2-BD59-A6C34878D82A}">
-                    <a16:rowId xmlns:a16="http://schemas.microsoft.com/office/drawing/2014/main" val="1909270051"/>
+                    <a16:rowId xmlns:a16="http://schemas.microsoft.com/office/drawing/2014/main" xmlns="" val="1909270051"/>
                   </a:ext>
                 </a:extLst>
               </a:tr>
@@ -4346,7 +4374,7 @@
                 </a:tc>
                 <a:extLst>
                   <a:ext uri="{0D108BD9-81ED-4DB2-BD59-A6C34878D82A}">
-                    <a16:rowId xmlns:a16="http://schemas.microsoft.com/office/drawing/2014/main" val="1361958173"/>
+                    <a16:rowId xmlns:a16="http://schemas.microsoft.com/office/drawing/2014/main" xmlns="" val="1361958173"/>
                   </a:ext>
                 </a:extLst>
               </a:tr>
@@ -4385,7 +4413,7 @@
                 </a:tc>
                 <a:extLst>
                   <a:ext uri="{0D108BD9-81ED-4DB2-BD59-A6C34878D82A}">
-                    <a16:rowId xmlns:a16="http://schemas.microsoft.com/office/drawing/2014/main" val="853388448"/>
+                    <a16:rowId xmlns:a16="http://schemas.microsoft.com/office/drawing/2014/main" xmlns="" val="853388448"/>
                   </a:ext>
                 </a:extLst>
               </a:tr>
@@ -4424,7 +4452,7 @@
                 </a:tc>
                 <a:extLst>
                   <a:ext uri="{0D108BD9-81ED-4DB2-BD59-A6C34878D82A}">
-                    <a16:rowId xmlns:a16="http://schemas.microsoft.com/office/drawing/2014/main" val="1985920573"/>
+                    <a16:rowId xmlns:a16="http://schemas.microsoft.com/office/drawing/2014/main" xmlns="" val="1985920573"/>
                   </a:ext>
                 </a:extLst>
               </a:tr>
@@ -4467,7 +4495,7 @@
                 </a:tc>
                 <a:extLst>
                   <a:ext uri="{0D108BD9-81ED-4DB2-BD59-A6C34878D82A}">
-                    <a16:rowId xmlns:a16="http://schemas.microsoft.com/office/drawing/2014/main" val="4030744758"/>
+                    <a16:rowId xmlns:a16="http://schemas.microsoft.com/office/drawing/2014/main" xmlns="" val="4030744758"/>
                   </a:ext>
                 </a:extLst>
               </a:tr>
@@ -4506,7 +4534,7 @@
                 </a:tc>
                 <a:extLst>
                   <a:ext uri="{0D108BD9-81ED-4DB2-BD59-A6C34878D82A}">
-                    <a16:rowId xmlns:a16="http://schemas.microsoft.com/office/drawing/2014/main" val="3954026308"/>
+                    <a16:rowId xmlns:a16="http://schemas.microsoft.com/office/drawing/2014/main" xmlns="" val="3954026308"/>
                   </a:ext>
                 </a:extLst>
               </a:tr>
@@ -4557,7 +4585,7 @@
                 </a:tc>
                 <a:extLst>
                   <a:ext uri="{0D108BD9-81ED-4DB2-BD59-A6C34878D82A}">
-                    <a16:rowId xmlns:a16="http://schemas.microsoft.com/office/drawing/2014/main" val="1559937"/>
+                    <a16:rowId xmlns:a16="http://schemas.microsoft.com/office/drawing/2014/main" xmlns="" val="1559937"/>
                   </a:ext>
                 </a:extLst>
               </a:tr>
@@ -4604,7 +4632,7 @@
                 </a:tc>
                 <a:extLst>
                   <a:ext uri="{0D108BD9-81ED-4DB2-BD59-A6C34878D82A}">
-                    <a16:rowId xmlns:a16="http://schemas.microsoft.com/office/drawing/2014/main" val="3089251845"/>
+                    <a16:rowId xmlns:a16="http://schemas.microsoft.com/office/drawing/2014/main" xmlns="" val="3089251845"/>
                   </a:ext>
                 </a:extLst>
               </a:tr>
@@ -4643,7 +4671,7 @@
                 </a:tc>
                 <a:extLst>
                   <a:ext uri="{0D108BD9-81ED-4DB2-BD59-A6C34878D82A}">
-                    <a16:rowId xmlns:a16="http://schemas.microsoft.com/office/drawing/2014/main" val="2500980708"/>
+                    <a16:rowId xmlns:a16="http://schemas.microsoft.com/office/drawing/2014/main" xmlns="" val="2500980708"/>
                   </a:ext>
                 </a:extLst>
               </a:tr>
@@ -4698,7 +4726,7 @@
                 </a:tc>
                 <a:extLst>
                   <a:ext uri="{0D108BD9-81ED-4DB2-BD59-A6C34878D82A}">
-                    <a16:rowId xmlns:a16="http://schemas.microsoft.com/office/drawing/2014/main" val="2506504948"/>
+                    <a16:rowId xmlns:a16="http://schemas.microsoft.com/office/drawing/2014/main" xmlns="" val="2506504948"/>
                   </a:ext>
                 </a:extLst>
               </a:tr>
@@ -4709,8 +4737,8 @@
                     <a:lstStyle/>
                     <a:p>
                       <a:r>
-                        <a:rPr lang="en-US" sz="1400" dirty="0"/>
-                        <a:t>Setup</a:t>
+                        <a:rPr lang="en-US" sz="1400" smtClean="0"/>
+                        <a:t>Robot2017</a:t>
                       </a:r>
                       <a:endParaRPr lang="fr-FR" sz="1400" dirty="0"/>
                     </a:p>
@@ -4728,7 +4756,11 @@
                       </a:r>
                       <a:r>
                         <a:rPr lang="en-US" sz="1400" baseline="0" dirty="0"/>
-                        <a:t> and build object instances so that data initialization order is thread-safe and deterministic.</a:t>
+                        <a:t> and build object instances </a:t>
+                      </a:r>
+                      <a:r>
+                        <a:rPr lang="en-US" sz="1400" baseline="0" dirty="0" smtClean="0"/>
+                        <a:t>of the 2017 robot. Hold all configurations</a:t>
                       </a:r>
                       <a:endParaRPr lang="fr-FR" sz="1400" dirty="0"/>
                     </a:p>
@@ -4737,7 +4769,7 @@
                 </a:tc>
                 <a:extLst>
                   <a:ext uri="{0D108BD9-81ED-4DB2-BD59-A6C34878D82A}">
-                    <a16:rowId xmlns:a16="http://schemas.microsoft.com/office/drawing/2014/main" val="3586628355"/>
+                    <a16:rowId xmlns:a16="http://schemas.microsoft.com/office/drawing/2014/main" xmlns="" val="3586628355"/>
                   </a:ext>
                 </a:extLst>
               </a:tr>
@@ -4776,7 +4808,7 @@
                 </a:tc>
                 <a:extLst>
                   <a:ext uri="{0D108BD9-81ED-4DB2-BD59-A6C34878D82A}">
-                    <a16:rowId xmlns:a16="http://schemas.microsoft.com/office/drawing/2014/main" val="2487713246"/>
+                    <a16:rowId xmlns:a16="http://schemas.microsoft.com/office/drawing/2014/main" xmlns="" val="2487713246"/>
                   </a:ext>
                 </a:extLst>
               </a:tr>
@@ -4815,7 +4847,7 @@
                 </a:tc>
                 <a:extLst>
                   <a:ext uri="{0D108BD9-81ED-4DB2-BD59-A6C34878D82A}">
-                    <a16:rowId xmlns:a16="http://schemas.microsoft.com/office/drawing/2014/main" val="3055302253"/>
+                    <a16:rowId xmlns:a16="http://schemas.microsoft.com/office/drawing/2014/main" xmlns="" val="3055302253"/>
                   </a:ext>
                 </a:extLst>
               </a:tr>
@@ -4858,7 +4890,7 @@
                 </a:tc>
                 <a:extLst>
                   <a:ext uri="{0D108BD9-81ED-4DB2-BD59-A6C34878D82A}">
-                    <a16:rowId xmlns:a16="http://schemas.microsoft.com/office/drawing/2014/main" val="3301582169"/>
+                    <a16:rowId xmlns:a16="http://schemas.microsoft.com/office/drawing/2014/main" xmlns="" val="3301582169"/>
                   </a:ext>
                 </a:extLst>
               </a:tr>

</xml_diff>

<commit_message>
Ajout log sur carte SD
</commit_message>
<xml_diff>
--- a/docs/PMI2017_archiSW.pptx
+++ b/docs/PMI2017_archiSW.pptx
@@ -242,7 +242,7 @@
           <a:p>
             <a:fld id="{2782ACDD-568A-4D5B-9A72-61F2F85B1323}" type="datetimeFigureOut">
               <a:rPr lang="fr-FR" smtClean="0"/>
-              <a:t>21/10/2016</a:t>
+              <a:t>24/10/2016</a:t>
             </a:fld>
             <a:endParaRPr lang="fr-FR"/>
           </a:p>
@@ -410,7 +410,7 @@
           <a:p>
             <a:fld id="{2782ACDD-568A-4D5B-9A72-61F2F85B1323}" type="datetimeFigureOut">
               <a:rPr lang="fr-FR" smtClean="0"/>
-              <a:t>21/10/2016</a:t>
+              <a:t>24/10/2016</a:t>
             </a:fld>
             <a:endParaRPr lang="fr-FR"/>
           </a:p>
@@ -588,7 +588,7 @@
           <a:p>
             <a:fld id="{2782ACDD-568A-4D5B-9A72-61F2F85B1323}" type="datetimeFigureOut">
               <a:rPr lang="fr-FR" smtClean="0"/>
-              <a:t>21/10/2016</a:t>
+              <a:t>24/10/2016</a:t>
             </a:fld>
             <a:endParaRPr lang="fr-FR"/>
           </a:p>
@@ -756,7 +756,7 @@
           <a:p>
             <a:fld id="{2782ACDD-568A-4D5B-9A72-61F2F85B1323}" type="datetimeFigureOut">
               <a:rPr lang="fr-FR" smtClean="0"/>
-              <a:t>21/10/2016</a:t>
+              <a:t>24/10/2016</a:t>
             </a:fld>
             <a:endParaRPr lang="fr-FR"/>
           </a:p>
@@ -1001,7 +1001,7 @@
           <a:p>
             <a:fld id="{2782ACDD-568A-4D5B-9A72-61F2F85B1323}" type="datetimeFigureOut">
               <a:rPr lang="fr-FR" smtClean="0"/>
-              <a:t>21/10/2016</a:t>
+              <a:t>24/10/2016</a:t>
             </a:fld>
             <a:endParaRPr lang="fr-FR"/>
           </a:p>
@@ -1230,7 +1230,7 @@
           <a:p>
             <a:fld id="{2782ACDD-568A-4D5B-9A72-61F2F85B1323}" type="datetimeFigureOut">
               <a:rPr lang="fr-FR" smtClean="0"/>
-              <a:t>21/10/2016</a:t>
+              <a:t>24/10/2016</a:t>
             </a:fld>
             <a:endParaRPr lang="fr-FR"/>
           </a:p>
@@ -1594,7 +1594,7 @@
           <a:p>
             <a:fld id="{2782ACDD-568A-4D5B-9A72-61F2F85B1323}" type="datetimeFigureOut">
               <a:rPr lang="fr-FR" smtClean="0"/>
-              <a:t>21/10/2016</a:t>
+              <a:t>24/10/2016</a:t>
             </a:fld>
             <a:endParaRPr lang="fr-FR"/>
           </a:p>
@@ -1711,7 +1711,7 @@
           <a:p>
             <a:fld id="{2782ACDD-568A-4D5B-9A72-61F2F85B1323}" type="datetimeFigureOut">
               <a:rPr lang="fr-FR" smtClean="0"/>
-              <a:t>21/10/2016</a:t>
+              <a:t>24/10/2016</a:t>
             </a:fld>
             <a:endParaRPr lang="fr-FR"/>
           </a:p>
@@ -1806,7 +1806,7 @@
           <a:p>
             <a:fld id="{2782ACDD-568A-4D5B-9A72-61F2F85B1323}" type="datetimeFigureOut">
               <a:rPr lang="fr-FR" smtClean="0"/>
-              <a:t>21/10/2016</a:t>
+              <a:t>24/10/2016</a:t>
             </a:fld>
             <a:endParaRPr lang="fr-FR"/>
           </a:p>
@@ -2081,7 +2081,7 @@
           <a:p>
             <a:fld id="{2782ACDD-568A-4D5B-9A72-61F2F85B1323}" type="datetimeFigureOut">
               <a:rPr lang="fr-FR" smtClean="0"/>
-              <a:t>21/10/2016</a:t>
+              <a:t>24/10/2016</a:t>
             </a:fld>
             <a:endParaRPr lang="fr-FR"/>
           </a:p>
@@ -2333,7 +2333,7 @@
           <a:p>
             <a:fld id="{2782ACDD-568A-4D5B-9A72-61F2F85B1323}" type="datetimeFigureOut">
               <a:rPr lang="fr-FR" smtClean="0"/>
-              <a:t>21/10/2016</a:t>
+              <a:t>24/10/2016</a:t>
             </a:fld>
             <a:endParaRPr lang="fr-FR"/>
           </a:p>
@@ -2544,7 +2544,7 @@
           <a:p>
             <a:fld id="{2782ACDD-568A-4D5B-9A72-61F2F85B1323}" type="datetimeFigureOut">
               <a:rPr lang="fr-FR" smtClean="0"/>
-              <a:t>21/10/2016</a:t>
+              <a:t>24/10/2016</a:t>
             </a:fld>
             <a:endParaRPr lang="fr-FR"/>
           </a:p>
@@ -3499,7 +3499,7 @@
         </p:nvSpPr>
         <p:spPr>
           <a:xfrm>
-            <a:off x="2532993" y="894166"/>
+            <a:off x="2115464" y="889173"/>
             <a:ext cx="1357937" cy="643233"/>
           </a:xfrm>
           <a:prstGeom prst="roundRect">
@@ -4119,6 +4119,54 @@
             <a:r>
               <a:rPr lang="en-US" smtClean="0"/>
               <a:t>HMI</a:t>
+            </a:r>
+            <a:endParaRPr lang="fr-FR" dirty="0"/>
+          </a:p>
+        </p:txBody>
+      </p:sp>
+      <p:sp>
+        <p:nvSpPr>
+          <p:cNvPr id="33" name="Rectangle : coins arrondis 16"/>
+          <p:cNvSpPr/>
+          <p:nvPr/>
+        </p:nvSpPr>
+        <p:spPr>
+          <a:xfrm>
+            <a:off x="3708466" y="878657"/>
+            <a:ext cx="661603" cy="643233"/>
+          </a:xfrm>
+          <a:prstGeom prst="roundRect">
+            <a:avLst/>
+          </a:prstGeom>
+        </p:spPr>
+        <p:style>
+          <a:lnRef idx="2">
+            <a:schemeClr val="accent1">
+              <a:shade val="50000"/>
+            </a:schemeClr>
+          </a:lnRef>
+          <a:fillRef idx="1">
+            <a:schemeClr val="accent1"/>
+          </a:fillRef>
+          <a:effectRef idx="0">
+            <a:schemeClr val="accent1"/>
+          </a:effectRef>
+          <a:fontRef idx="minor">
+            <a:schemeClr val="lt1"/>
+          </a:fontRef>
+        </p:style>
+        <p:txBody>
+          <a:bodyPr rtlCol="0" anchor="ctr"/>
+          <a:lstStyle/>
+          <a:p>
+            <a:pPr algn="ctr"/>
+            <a:r>
+              <a:rPr lang="en-US" dirty="0" err="1" smtClean="0"/>
+              <a:t>Spi</a:t>
+            </a:r>
+            <a:r>
+              <a:rPr lang="en-US" dirty="0" smtClean="0"/>
+              <a:t>/SD</a:t>
             </a:r>
             <a:endParaRPr lang="fr-FR" dirty="0"/>
           </a:p>
@@ -4164,14 +4212,14 @@
             <p:ph idx="1"/>
             <p:extLst>
               <p:ext uri="{D42A27DB-BD31-4B8C-83A1-F6EECF244321}">
-                <p14:modId xmlns:p14="http://schemas.microsoft.com/office/powerpoint/2010/main" val="3339735760"/>
+                <p14:modId xmlns:p14="http://schemas.microsoft.com/office/powerpoint/2010/main" val="1463140914"/>
               </p:ext>
             </p:extLst>
           </p:nvPr>
         </p:nvGraphicFramePr>
         <p:xfrm>
           <a:off x="990075" y="290084"/>
-          <a:ext cx="9960128" cy="6198696"/>
+          <a:ext cx="9960128" cy="6503496"/>
         </p:xfrm>
         <a:graphic>
           <a:graphicData uri="http://schemas.openxmlformats.org/drawingml/2006/table">
@@ -4272,6 +4320,56 @@
                     <a16:rowId xmlns:a16="http://schemas.microsoft.com/office/drawing/2014/main" xmlns="" val="3975330181"/>
                   </a:ext>
                 </a:extLst>
+              </a:tr>
+              <a:tr h="290333">
+                <a:tc>
+                  <a:txBody>
+                    <a:bodyPr/>
+                    <a:lstStyle/>
+                    <a:p>
+                      <a:r>
+                        <a:rPr lang="en-US" sz="1400" dirty="0" err="1" smtClean="0"/>
+                        <a:t>Spi</a:t>
+                      </a:r>
+                      <a:r>
+                        <a:rPr lang="en-US" sz="1400" dirty="0" smtClean="0"/>
+                        <a:t>/SD</a:t>
+                      </a:r>
+                      <a:endParaRPr lang="fr-FR" sz="1400" dirty="0"/>
+                    </a:p>
+                  </a:txBody>
+                  <a:tcPr/>
+                </a:tc>
+                <a:tc>
+                  <a:txBody>
+                    <a:bodyPr/>
+                    <a:lstStyle/>
+                    <a:p>
+                      <a:r>
+                        <a:rPr lang="en-US" sz="1400" dirty="0" smtClean="0"/>
+                        <a:t>Manage </a:t>
+                      </a:r>
+                      <a:r>
+                        <a:rPr lang="en-US" sz="1400" dirty="0" err="1" smtClean="0"/>
+                        <a:t>Spi</a:t>
+                      </a:r>
+                      <a:r>
+                        <a:rPr lang="en-US" sz="1400" dirty="0" smtClean="0"/>
+                        <a:t> </a:t>
+                      </a:r>
+                      <a:r>
+                        <a:rPr lang="en-US" sz="1400" smtClean="0"/>
+                        <a:t>bus, read </a:t>
+                      </a:r>
+                      <a:r>
+                        <a:rPr lang="en-US" sz="1400" dirty="0" smtClean="0"/>
+                        <a:t>SD cards, manage filesystem.</a:t>
+                      </a:r>
+                      <a:endParaRPr lang="fr-FR" sz="1400" dirty="0"/>
+                    </a:p>
+                  </a:txBody>
+                  <a:tcPr/>
+                </a:tc>
               </a:tr>
               <a:tr h="290333">
                 <a:tc>

</xml_diff>

<commit_message>
SW Cleaning (see k#104) : unused code deleted, Uart driver isolated, Strings isolated, SW Architecture conformity
</commit_message>
<xml_diff>
--- a/docs/PMI2017_archiSW.pptx
+++ b/docs/PMI2017_archiSW.pptx
@@ -244,7 +244,7 @@
           <a:p>
             <a:fld id="{2782ACDD-568A-4D5B-9A72-61F2F85B1323}" type="datetimeFigureOut">
               <a:rPr lang="fr-FR" smtClean="0"/>
-              <a:t>13/03/2017</a:t>
+              <a:t>15/03/2017</a:t>
             </a:fld>
             <a:endParaRPr lang="fr-FR"/>
           </a:p>
@@ -412,7 +412,7 @@
           <a:p>
             <a:fld id="{2782ACDD-568A-4D5B-9A72-61F2F85B1323}" type="datetimeFigureOut">
               <a:rPr lang="fr-FR" smtClean="0"/>
-              <a:t>13/03/2017</a:t>
+              <a:t>15/03/2017</a:t>
             </a:fld>
             <a:endParaRPr lang="fr-FR"/>
           </a:p>
@@ -590,7 +590,7 @@
           <a:p>
             <a:fld id="{2782ACDD-568A-4D5B-9A72-61F2F85B1323}" type="datetimeFigureOut">
               <a:rPr lang="fr-FR" smtClean="0"/>
-              <a:t>13/03/2017</a:t>
+              <a:t>15/03/2017</a:t>
             </a:fld>
             <a:endParaRPr lang="fr-FR"/>
           </a:p>
@@ -758,7 +758,7 @@
           <a:p>
             <a:fld id="{2782ACDD-568A-4D5B-9A72-61F2F85B1323}" type="datetimeFigureOut">
               <a:rPr lang="fr-FR" smtClean="0"/>
-              <a:t>13/03/2017</a:t>
+              <a:t>15/03/2017</a:t>
             </a:fld>
             <a:endParaRPr lang="fr-FR"/>
           </a:p>
@@ -1003,7 +1003,7 @@
           <a:p>
             <a:fld id="{2782ACDD-568A-4D5B-9A72-61F2F85B1323}" type="datetimeFigureOut">
               <a:rPr lang="fr-FR" smtClean="0"/>
-              <a:t>13/03/2017</a:t>
+              <a:t>15/03/2017</a:t>
             </a:fld>
             <a:endParaRPr lang="fr-FR"/>
           </a:p>
@@ -1232,7 +1232,7 @@
           <a:p>
             <a:fld id="{2782ACDD-568A-4D5B-9A72-61F2F85B1323}" type="datetimeFigureOut">
               <a:rPr lang="fr-FR" smtClean="0"/>
-              <a:t>13/03/2017</a:t>
+              <a:t>15/03/2017</a:t>
             </a:fld>
             <a:endParaRPr lang="fr-FR"/>
           </a:p>
@@ -1596,7 +1596,7 @@
           <a:p>
             <a:fld id="{2782ACDD-568A-4D5B-9A72-61F2F85B1323}" type="datetimeFigureOut">
               <a:rPr lang="fr-FR" smtClean="0"/>
-              <a:t>13/03/2017</a:t>
+              <a:t>15/03/2017</a:t>
             </a:fld>
             <a:endParaRPr lang="fr-FR"/>
           </a:p>
@@ -1713,7 +1713,7 @@
           <a:p>
             <a:fld id="{2782ACDD-568A-4D5B-9A72-61F2F85B1323}" type="datetimeFigureOut">
               <a:rPr lang="fr-FR" smtClean="0"/>
-              <a:t>13/03/2017</a:t>
+              <a:t>15/03/2017</a:t>
             </a:fld>
             <a:endParaRPr lang="fr-FR"/>
           </a:p>
@@ -1808,7 +1808,7 @@
           <a:p>
             <a:fld id="{2782ACDD-568A-4D5B-9A72-61F2F85B1323}" type="datetimeFigureOut">
               <a:rPr lang="fr-FR" smtClean="0"/>
-              <a:t>13/03/2017</a:t>
+              <a:t>15/03/2017</a:t>
             </a:fld>
             <a:endParaRPr lang="fr-FR"/>
           </a:p>
@@ -2083,7 +2083,7 @@
           <a:p>
             <a:fld id="{2782ACDD-568A-4D5B-9A72-61F2F85B1323}" type="datetimeFigureOut">
               <a:rPr lang="fr-FR" smtClean="0"/>
-              <a:t>13/03/2017</a:t>
+              <a:t>15/03/2017</a:t>
             </a:fld>
             <a:endParaRPr lang="fr-FR"/>
           </a:p>
@@ -2335,7 +2335,7 @@
           <a:p>
             <a:fld id="{2782ACDD-568A-4D5B-9A72-61F2F85B1323}" type="datetimeFigureOut">
               <a:rPr lang="fr-FR" smtClean="0"/>
-              <a:t>13/03/2017</a:t>
+              <a:t>15/03/2017</a:t>
             </a:fld>
             <a:endParaRPr lang="fr-FR"/>
           </a:p>
@@ -2546,7 +2546,7 @@
           <a:p>
             <a:fld id="{2782ACDD-568A-4D5B-9A72-61F2F85B1323}" type="datetimeFigureOut">
               <a:rPr lang="fr-FR" smtClean="0"/>
-              <a:t>13/03/2017</a:t>
+              <a:t>15/03/2017</a:t>
             </a:fld>
             <a:endParaRPr lang="fr-FR"/>
           </a:p>
@@ -3397,12 +3397,8 @@
           <a:p>
             <a:pPr algn="ctr"/>
             <a:r>
-              <a:rPr lang="en-US" dirty="0" err="1"/>
-              <a:t>Gpio</a:t>
-            </a:r>
-            <a:r>
-              <a:rPr lang="en-US" dirty="0"/>
-              <a:t> tools</a:t>
+              <a:rPr lang="en-US" dirty="0" smtClean="0"/>
+              <a:t>Log</a:t>
             </a:r>
             <a:endParaRPr lang="fr-FR" dirty="0"/>
           </a:p>
@@ -3700,8 +3696,12 @@
           <a:p>
             <a:pPr algn="ctr"/>
             <a:r>
+              <a:rPr lang="en-US" dirty="0"/>
+              <a:t>C</a:t>
+            </a:r>
+            <a:r>
               <a:rPr lang="en-US" dirty="0" smtClean="0"/>
-              <a:t>core</a:t>
+              <a:t>ore</a:t>
             </a:r>
             <a:endParaRPr lang="fr-FR" dirty="0"/>
           </a:p>
@@ -5227,14 +5227,14 @@
                 <a:gridCol w="2843689">
                   <a:extLst>
                     <a:ext uri="{9D8B030D-6E8A-4147-A177-3AD203B41FA5}">
-                      <a16:colId xmlns:a16="http://schemas.microsoft.com/office/drawing/2014/main" xmlns="" val="4249046580"/>
+                      <a16:colId xmlns="" xmlns:a16="http://schemas.microsoft.com/office/drawing/2014/main" val="4249046580"/>
                     </a:ext>
                   </a:extLst>
                 </a:gridCol>
                 <a:gridCol w="7116439">
                   <a:extLst>
                     <a:ext uri="{9D8B030D-6E8A-4147-A177-3AD203B41FA5}">
-                      <a16:colId xmlns:a16="http://schemas.microsoft.com/office/drawing/2014/main" xmlns="" val="2166689304"/>
+                      <a16:colId xmlns="" xmlns:a16="http://schemas.microsoft.com/office/drawing/2014/main" val="2166689304"/>
                     </a:ext>
                   </a:extLst>
                 </a:gridCol>
@@ -5270,7 +5270,7 @@
                 </a:tc>
                 <a:extLst>
                   <a:ext uri="{0D108BD9-81ED-4DB2-BD59-A6C34878D82A}">
-                    <a16:rowId xmlns:a16="http://schemas.microsoft.com/office/drawing/2014/main" xmlns="" val="1558262199"/>
+                    <a16:rowId xmlns="" xmlns:a16="http://schemas.microsoft.com/office/drawing/2014/main" val="1558262199"/>
                   </a:ext>
                 </a:extLst>
               </a:tr>
@@ -5313,7 +5313,7 @@
                 </a:tc>
                 <a:extLst>
                   <a:ext uri="{0D108BD9-81ED-4DB2-BD59-A6C34878D82A}">
-                    <a16:rowId xmlns:a16="http://schemas.microsoft.com/office/drawing/2014/main" xmlns="" val="3975330181"/>
+                    <a16:rowId xmlns="" xmlns:a16="http://schemas.microsoft.com/office/drawing/2014/main" val="3975330181"/>
                   </a:ext>
                 </a:extLst>
               </a:tr>
@@ -5398,7 +5398,7 @@
                 </a:tc>
                 <a:extLst>
                   <a:ext uri="{0D108BD9-81ED-4DB2-BD59-A6C34878D82A}">
-                    <a16:rowId xmlns:a16="http://schemas.microsoft.com/office/drawing/2014/main" xmlns="" val="145727790"/>
+                    <a16:rowId xmlns="" xmlns:a16="http://schemas.microsoft.com/office/drawing/2014/main" val="145727790"/>
                   </a:ext>
                 </a:extLst>
               </a:tr>
@@ -5433,7 +5433,7 @@
                 </a:tc>
                 <a:extLst>
                   <a:ext uri="{0D108BD9-81ED-4DB2-BD59-A6C34878D82A}">
-                    <a16:rowId xmlns:a16="http://schemas.microsoft.com/office/drawing/2014/main" xmlns="" val="1909270051"/>
+                    <a16:rowId xmlns="" xmlns:a16="http://schemas.microsoft.com/office/drawing/2014/main" val="1909270051"/>
                   </a:ext>
                 </a:extLst>
               </a:tr>
@@ -5468,7 +5468,7 @@
                 </a:tc>
                 <a:extLst>
                   <a:ext uri="{0D108BD9-81ED-4DB2-BD59-A6C34878D82A}">
-                    <a16:rowId xmlns:a16="http://schemas.microsoft.com/office/drawing/2014/main" xmlns="" val="1361958173"/>
+                    <a16:rowId xmlns="" xmlns:a16="http://schemas.microsoft.com/office/drawing/2014/main" val="1361958173"/>
                   </a:ext>
                 </a:extLst>
               </a:tr>
@@ -5507,7 +5507,7 @@
                 </a:tc>
                 <a:extLst>
                   <a:ext uri="{0D108BD9-81ED-4DB2-BD59-A6C34878D82A}">
-                    <a16:rowId xmlns:a16="http://schemas.microsoft.com/office/drawing/2014/main" xmlns="" val="853388448"/>
+                    <a16:rowId xmlns="" xmlns:a16="http://schemas.microsoft.com/office/drawing/2014/main" val="853388448"/>
                   </a:ext>
                 </a:extLst>
               </a:tr>
@@ -5546,7 +5546,7 @@
                 </a:tc>
                 <a:extLst>
                   <a:ext uri="{0D108BD9-81ED-4DB2-BD59-A6C34878D82A}">
-                    <a16:rowId xmlns:a16="http://schemas.microsoft.com/office/drawing/2014/main" xmlns="" val="1985920573"/>
+                    <a16:rowId xmlns="" xmlns:a16="http://schemas.microsoft.com/office/drawing/2014/main" val="1985920573"/>
                   </a:ext>
                 </a:extLst>
               </a:tr>
@@ -5589,7 +5589,7 @@
                 </a:tc>
                 <a:extLst>
                   <a:ext uri="{0D108BD9-81ED-4DB2-BD59-A6C34878D82A}">
-                    <a16:rowId xmlns:a16="http://schemas.microsoft.com/office/drawing/2014/main" xmlns="" val="4030744758"/>
+                    <a16:rowId xmlns="" xmlns:a16="http://schemas.microsoft.com/office/drawing/2014/main" val="4030744758"/>
                   </a:ext>
                 </a:extLst>
               </a:tr>
@@ -5628,7 +5628,7 @@
                 </a:tc>
                 <a:extLst>
                   <a:ext uri="{0D108BD9-81ED-4DB2-BD59-A6C34878D82A}">
-                    <a16:rowId xmlns:a16="http://schemas.microsoft.com/office/drawing/2014/main" xmlns="" val="3954026308"/>
+                    <a16:rowId xmlns="" xmlns:a16="http://schemas.microsoft.com/office/drawing/2014/main" val="3954026308"/>
                   </a:ext>
                 </a:extLst>
               </a:tr>
@@ -5679,7 +5679,7 @@
                 </a:tc>
                 <a:extLst>
                   <a:ext uri="{0D108BD9-81ED-4DB2-BD59-A6C34878D82A}">
-                    <a16:rowId xmlns:a16="http://schemas.microsoft.com/office/drawing/2014/main" xmlns="" val="1559937"/>
+                    <a16:rowId xmlns="" xmlns:a16="http://schemas.microsoft.com/office/drawing/2014/main" val="1559937"/>
                   </a:ext>
                 </a:extLst>
               </a:tr>
@@ -5726,7 +5726,7 @@
                 </a:tc>
                 <a:extLst>
                   <a:ext uri="{0D108BD9-81ED-4DB2-BD59-A6C34878D82A}">
-                    <a16:rowId xmlns:a16="http://schemas.microsoft.com/office/drawing/2014/main" xmlns="" val="3089251845"/>
+                    <a16:rowId xmlns="" xmlns:a16="http://schemas.microsoft.com/office/drawing/2014/main" val="3089251845"/>
                   </a:ext>
                 </a:extLst>
               </a:tr>
@@ -5765,7 +5765,7 @@
                 </a:tc>
                 <a:extLst>
                   <a:ext uri="{0D108BD9-81ED-4DB2-BD59-A6C34878D82A}">
-                    <a16:rowId xmlns:a16="http://schemas.microsoft.com/office/drawing/2014/main" xmlns="" val="2500980708"/>
+                    <a16:rowId xmlns="" xmlns:a16="http://schemas.microsoft.com/office/drawing/2014/main" val="2500980708"/>
                   </a:ext>
                 </a:extLst>
               </a:tr>
@@ -5820,7 +5820,7 @@
                 </a:tc>
                 <a:extLst>
                   <a:ext uri="{0D108BD9-81ED-4DB2-BD59-A6C34878D82A}">
-                    <a16:rowId xmlns:a16="http://schemas.microsoft.com/office/drawing/2014/main" xmlns="" val="2506504948"/>
+                    <a16:rowId xmlns="" xmlns:a16="http://schemas.microsoft.com/office/drawing/2014/main" val="2506504948"/>
                   </a:ext>
                 </a:extLst>
               </a:tr>
@@ -5863,7 +5863,7 @@
                 </a:tc>
                 <a:extLst>
                   <a:ext uri="{0D108BD9-81ED-4DB2-BD59-A6C34878D82A}">
-                    <a16:rowId xmlns:a16="http://schemas.microsoft.com/office/drawing/2014/main" xmlns="" val="3586628355"/>
+                    <a16:rowId xmlns="" xmlns:a16="http://schemas.microsoft.com/office/drawing/2014/main" val="3586628355"/>
                   </a:ext>
                 </a:extLst>
               </a:tr>
@@ -5902,7 +5902,7 @@
                 </a:tc>
                 <a:extLst>
                   <a:ext uri="{0D108BD9-81ED-4DB2-BD59-A6C34878D82A}">
-                    <a16:rowId xmlns:a16="http://schemas.microsoft.com/office/drawing/2014/main" xmlns="" val="2487713246"/>
+                    <a16:rowId xmlns="" xmlns:a16="http://schemas.microsoft.com/office/drawing/2014/main" val="2487713246"/>
                   </a:ext>
                 </a:extLst>
               </a:tr>
@@ -5941,7 +5941,7 @@
                 </a:tc>
                 <a:extLst>
                   <a:ext uri="{0D108BD9-81ED-4DB2-BD59-A6C34878D82A}">
-                    <a16:rowId xmlns:a16="http://schemas.microsoft.com/office/drawing/2014/main" xmlns="" val="3055302253"/>
+                    <a16:rowId xmlns="" xmlns:a16="http://schemas.microsoft.com/office/drawing/2014/main" val="3055302253"/>
                   </a:ext>
                 </a:extLst>
               </a:tr>
@@ -5984,7 +5984,7 @@
                 </a:tc>
                 <a:extLst>
                   <a:ext uri="{0D108BD9-81ED-4DB2-BD59-A6C34878D82A}">
-                    <a16:rowId xmlns:a16="http://schemas.microsoft.com/office/drawing/2014/main" xmlns="" val="3301582169"/>
+                    <a16:rowId xmlns="" xmlns:a16="http://schemas.microsoft.com/office/drawing/2014/main" val="3301582169"/>
                   </a:ext>
                 </a:extLst>
               </a:tr>
@@ -7243,14 +7243,14 @@
           <p:nvPr>
             <p:extLst>
               <p:ext uri="{D42A27DB-BD31-4B8C-83A1-F6EECF244321}">
-                <p14:modId xmlns:p14="http://schemas.microsoft.com/office/powerpoint/2010/main" val="2948931409"/>
+                <p14:modId xmlns:p14="http://schemas.microsoft.com/office/powerpoint/2010/main" val="1147345377"/>
               </p:ext>
             </p:extLst>
           </p:nvPr>
         </p:nvGraphicFramePr>
         <p:xfrm>
           <a:off x="977900" y="2463799"/>
-          <a:ext cx="10541000" cy="3636054"/>
+          <a:ext cx="10541000" cy="3926906"/>
         </p:xfrm>
         <a:graphic>
           <a:graphicData uri="http://schemas.openxmlformats.org/drawingml/2006/table">
@@ -7737,6 +7737,89 @@
                       <a:r>
                         <a:rPr lang="en-US" sz="1100" dirty="0" smtClean="0"/>
                         <a:t>Read/Send I2C data.</a:t>
+                      </a:r>
+                      <a:endParaRPr lang="fr-FR" sz="1100" dirty="0"/>
+                    </a:p>
+                  </a:txBody>
+                  <a:tcPr/>
+                </a:tc>
+              </a:tr>
+              <a:tr h="290852">
+                <a:tc>
+                  <a:txBody>
+                    <a:bodyPr/>
+                    <a:lstStyle/>
+                    <a:p>
+                      <a:pPr marL="0" marR="0" lvl="0" indent="0" algn="l" defTabSz="914400" rtl="0" eaLnBrk="1" fontAlgn="auto" latinLnBrk="0" hangingPunct="1">
+                        <a:lnSpc>
+                          <a:spcPct val="100000"/>
+                        </a:lnSpc>
+                        <a:spcBef>
+                          <a:spcPts val="0"/>
+                        </a:spcBef>
+                        <a:spcAft>
+                          <a:spcPts val="0"/>
+                        </a:spcAft>
+                        <a:buClrTx/>
+                        <a:buSzTx/>
+                        <a:buFontTx/>
+                        <a:buNone/>
+                        <a:tabLst/>
+                        <a:defRPr/>
+                      </a:pPr>
+                      <a:r>
+                        <a:rPr lang="en-US" sz="1100" dirty="0" smtClean="0"/>
+                        <a:t>IT</a:t>
+                      </a:r>
+                      <a:endParaRPr lang="fr-FR" sz="1100" dirty="0" smtClean="0"/>
+                    </a:p>
+                  </a:txBody>
+                  <a:tcPr/>
+                </a:tc>
+                <a:tc>
+                  <a:txBody>
+                    <a:bodyPr/>
+                    <a:lstStyle/>
+                    <a:p>
+                      <a:r>
+                        <a:rPr lang="fr-FR" sz="1100" dirty="0" err="1" smtClean="0"/>
+                        <a:t>SysTick_Handler</a:t>
+                      </a:r>
+                      <a:endParaRPr lang="fr-FR" sz="1100" dirty="0"/>
+                    </a:p>
+                  </a:txBody>
+                  <a:tcPr/>
+                </a:tc>
+                <a:tc>
+                  <a:txBody>
+                    <a:bodyPr/>
+                    <a:lstStyle/>
+                    <a:p>
+                      <a:r>
+                        <a:rPr lang="en-US" sz="1100" dirty="0" smtClean="0"/>
+                        <a:t>Period : 1ms</a:t>
+                      </a:r>
+                      <a:endParaRPr lang="fr-FR" sz="1100" dirty="0"/>
+                    </a:p>
+                  </a:txBody>
+                  <a:tcPr/>
+                </a:tc>
+                <a:tc>
+                  <a:txBody>
+                    <a:bodyPr/>
+                    <a:lstStyle/>
+                    <a:p>
+                      <a:r>
+                        <a:rPr lang="en-US" sz="1100" dirty="0" smtClean="0"/>
+                        <a:t>Boot</a:t>
+                      </a:r>
+                      <a:r>
+                        <a:rPr lang="en-US" sz="1100" baseline="0" dirty="0" smtClean="0"/>
+                        <a:t> </a:t>
+                      </a:r>
+                      <a:r>
+                        <a:rPr lang="en-US" sz="1100" baseline="0" smtClean="0"/>
+                        <a:t>time count</a:t>
                       </a:r>
                       <a:endParaRPr lang="fr-FR" sz="1100" dirty="0"/>
                     </a:p>

</xml_diff>